<commit_message>
Update Project Application Development.pptx
</commit_message>
<xml_diff>
--- a/Paper Work/Presentation/Project Application Development.pptx
+++ b/Paper Work/Presentation/Project Application Development.pptx
@@ -2,7 +2,7 @@
 <file path=ppt/presentation.xml><?xml version="1.0" encoding="utf-8"?>
 <p:presentation xmlns:a="http://schemas.openxmlformats.org/drawingml/2006/main" xmlns:r="http://schemas.openxmlformats.org/officeDocument/2006/relationships" xmlns:p="http://schemas.openxmlformats.org/presentationml/2006/main" saveSubsetFonts="1" autoCompressPictures="0">
   <p:sldMasterIdLst>
-    <p:sldMasterId id="2147483671" r:id="rId1"/>
+    <p:sldMasterId id="2147483695" r:id="rId1"/>
   </p:sldMasterIdLst>
   <p:notesMasterIdLst>
     <p:notesMasterId r:id="rId11"/>
@@ -21,7 +21,7 @@
     <p:sldId id="276" r:id="rId9"/>
     <p:sldId id="278" r:id="rId10"/>
   </p:sldIdLst>
-  <p:sldSz cx="12192000" cy="6858000"/>
+  <p:sldSz cx="9828213" cy="6858000"/>
   <p:notesSz cx="7023100" cy="9309100"/>
   <p:defaultTextStyle>
     <a:defPPr>
@@ -208,7 +208,7 @@
           <a:p>
             <a:fld id="{2BCAFC7A-71DD-4C2C-B63D-60FDC7DD5449}" type="datetimeFigureOut">
               <a:rPr lang="en-US" smtClean="0"/>
-              <a:t>1/17/2019</a:t>
+              <a:t>1/20/2019</a:t>
             </a:fld>
             <a:endParaRPr lang="en-US"/>
           </a:p>
@@ -373,7 +373,7 @@
           <a:p>
             <a:fld id="{D85ECAFD-F005-4163-B10D-85806DC43F93}" type="datetimeFigureOut">
               <a:rPr lang="en-US" smtClean="0"/>
-              <a:t>1/17/2019</a:t>
+              <a:t>1/20/2019</a:t>
             </a:fld>
             <a:endParaRPr lang="en-US"/>
           </a:p>
@@ -391,8 +391,8 @@
         </p:nvSpPr>
         <p:spPr>
           <a:xfrm>
-            <a:off x="719138" y="1163638"/>
-            <a:ext cx="5584825" cy="3141662"/>
+            <a:off x="1260475" y="1163638"/>
+            <a:ext cx="4502150" cy="3141662"/>
           </a:xfrm>
           <a:prstGeom prst="rect">
             <a:avLst/>
@@ -667,7 +667,12 @@
             <p:ph type="sldImg"/>
           </p:nvPr>
         </p:nvSpPr>
-        <p:spPr/>
+        <p:spPr>
+          <a:xfrm>
+            <a:off x="1260475" y="1163638"/>
+            <a:ext cx="4502150" cy="3141662"/>
+          </a:xfrm>
+        </p:spPr>
       </p:sp>
       <p:sp>
         <p:nvSpPr>
@@ -754,7 +759,12 @@
             <p:ph type="sldImg"/>
           </p:nvPr>
         </p:nvSpPr>
-        <p:spPr/>
+        <p:spPr>
+          <a:xfrm>
+            <a:off x="1260475" y="1163638"/>
+            <a:ext cx="4502150" cy="3141662"/>
+          </a:xfrm>
+        </p:spPr>
       </p:sp>
       <p:sp>
         <p:nvSpPr>
@@ -841,7 +851,12 @@
             <p:ph type="sldImg"/>
           </p:nvPr>
         </p:nvSpPr>
-        <p:spPr/>
+        <p:spPr>
+          <a:xfrm>
+            <a:off x="1260475" y="1163638"/>
+            <a:ext cx="4502150" cy="3141662"/>
+          </a:xfrm>
+        </p:spPr>
       </p:sp>
       <p:sp>
         <p:nvSpPr>
@@ -928,7 +943,12 @@
             <p:ph type="sldImg"/>
           </p:nvPr>
         </p:nvSpPr>
-        <p:spPr/>
+        <p:spPr>
+          <a:xfrm>
+            <a:off x="1260475" y="1163638"/>
+            <a:ext cx="4502150" cy="3141662"/>
+          </a:xfrm>
+        </p:spPr>
       </p:sp>
       <p:sp>
         <p:nvSpPr>
@@ -1015,7 +1035,12 @@
             <p:ph type="sldImg"/>
           </p:nvPr>
         </p:nvSpPr>
-        <p:spPr/>
+        <p:spPr>
+          <a:xfrm>
+            <a:off x="1260475" y="1163638"/>
+            <a:ext cx="4502150" cy="3141662"/>
+          </a:xfrm>
+        </p:spPr>
       </p:sp>
       <p:sp>
         <p:nvSpPr>
@@ -1102,7 +1127,12 @@
             <p:ph type="sldImg"/>
           </p:nvPr>
         </p:nvSpPr>
-        <p:spPr/>
+        <p:spPr>
+          <a:xfrm>
+            <a:off x="1260475" y="1163638"/>
+            <a:ext cx="4502150" cy="3141662"/>
+          </a:xfrm>
+        </p:spPr>
       </p:sp>
       <p:sp>
         <p:nvSpPr>
@@ -1189,7 +1219,12 @@
             <p:ph type="sldImg"/>
           </p:nvPr>
         </p:nvSpPr>
-        <p:spPr/>
+        <p:spPr>
+          <a:xfrm>
+            <a:off x="1260475" y="1163638"/>
+            <a:ext cx="4502150" cy="3141662"/>
+          </a:xfrm>
+        </p:spPr>
       </p:sp>
       <p:sp>
         <p:nvSpPr>
@@ -1276,7 +1311,12 @@
             <p:ph type="sldImg"/>
           </p:nvPr>
         </p:nvSpPr>
-        <p:spPr/>
+        <p:spPr>
+          <a:xfrm>
+            <a:off x="1260475" y="1163638"/>
+            <a:ext cx="4502150" cy="3141662"/>
+          </a:xfrm>
+        </p:spPr>
       </p:sp>
       <p:sp>
         <p:nvSpPr>
@@ -1363,7 +1403,12 @@
             <p:ph type="sldImg"/>
           </p:nvPr>
         </p:nvSpPr>
-        <p:spPr/>
+        <p:spPr>
+          <a:xfrm>
+            <a:off x="1260475" y="1163638"/>
+            <a:ext cx="4502150" cy="3141662"/>
+          </a:xfrm>
+        </p:spPr>
       </p:sp>
       <p:sp>
         <p:nvSpPr>
@@ -1424,16 +1469,8 @@
 </file>
 
 <file path=ppt/slideLayouts/slideLayout1.xml><?xml version="1.0" encoding="utf-8"?>
-<p:sldLayout xmlns:a="http://schemas.openxmlformats.org/drawingml/2006/main" xmlns:r="http://schemas.openxmlformats.org/officeDocument/2006/relationships" xmlns:p="http://schemas.openxmlformats.org/presentationml/2006/main" type="title" preserve="1">
+<p:sldLayout xmlns:a="http://schemas.openxmlformats.org/drawingml/2006/main" xmlns:r="http://schemas.openxmlformats.org/officeDocument/2006/relationships" xmlns:p="http://schemas.openxmlformats.org/presentationml/2006/main" showMasterSp="0" type="title" preserve="1">
   <p:cSld name="Title Slide">
-    <p:bg>
-      <p:bgPr>
-        <a:solidFill>
-          <a:schemeClr val="bg1"/>
-        </a:solidFill>
-        <a:effectLst/>
-      </p:bgPr>
-    </p:bg>
     <p:spTree>
       <p:nvGrpSpPr>
         <p:cNvPr id="1" name=""/>
@@ -1456,8 +1493,8 @@
         </p:nvSpPr>
         <p:spPr>
           <a:xfrm>
-            <a:off x="3175" y="6400800"/>
-            <a:ext cx="12188825" cy="457200"/>
+            <a:off x="2561" y="6400800"/>
+            <a:ext cx="9825654" cy="457200"/>
           </a:xfrm>
           <a:prstGeom prst="rect">
             <a:avLst/>
@@ -1494,8 +1531,8 @@
         </p:nvSpPr>
         <p:spPr>
           <a:xfrm>
-            <a:off x="15" y="6334316"/>
-            <a:ext cx="12188825" cy="64008"/>
+            <a:off x="13" y="6334316"/>
+            <a:ext cx="9825654" cy="64008"/>
           </a:xfrm>
           <a:prstGeom prst="rect">
             <a:avLst/>
@@ -1536,8 +1573,8 @@
         </p:nvSpPr>
         <p:spPr>
           <a:xfrm>
-            <a:off x="1097280" y="758952"/>
-            <a:ext cx="10058400" cy="3566160"/>
+            <a:off x="884539" y="758952"/>
+            <a:ext cx="8108276" cy="3566160"/>
           </a:xfrm>
         </p:spPr>
         <p:txBody>
@@ -1580,8 +1617,8 @@
         </p:nvSpPr>
         <p:spPr>
           <a:xfrm>
-            <a:off x="1100051" y="4455620"/>
-            <a:ext cx="10058400" cy="1143000"/>
+            <a:off x="886773" y="4455621"/>
+            <a:ext cx="8108276" cy="1143000"/>
           </a:xfrm>
         </p:spPr>
         <p:txBody>
@@ -1657,7 +1694,7 @@
           <a:p>
             <a:fld id="{4AAD347D-5ACD-4C99-B74B-A9C85AD731AF}" type="datetimeFigureOut">
               <a:rPr lang="en-US" smtClean="0"/>
-              <a:t>1/17/2019</a:t>
+              <a:t>1/20/2019</a:t>
             </a:fld>
             <a:endParaRPr lang="en-US"/>
           </a:p>
@@ -1717,8 +1754,8 @@
         </p:nvCxnSpPr>
         <p:spPr>
           <a:xfrm>
-            <a:off x="1207658" y="4343400"/>
-            <a:ext cx="9875520" cy="0"/>
+            <a:off x="973517" y="4343400"/>
+            <a:ext cx="7960853" cy="0"/>
           </a:xfrm>
           <a:prstGeom prst="line">
             <a:avLst/>
@@ -1750,7 +1787,7 @@
     </p:spTree>
     <p:extLst>
       <p:ext uri="{BB962C8B-B14F-4D97-AF65-F5344CB8AC3E}">
-        <p14:creationId xmlns:p14="http://schemas.microsoft.com/office/powerpoint/2010/main" val="20373951"/>
+        <p14:creationId xmlns:p14="http://schemas.microsoft.com/office/powerpoint/2010/main" val="2507103613"/>
       </p:ext>
     </p:extLst>
   </p:cSld>
@@ -1869,7 +1906,7 @@
           <a:p>
             <a:fld id="{4509A250-FF31-4206-8172-F9D3106AACB1}" type="datetimeFigureOut">
               <a:rPr lang="en-US" smtClean="0"/>
-              <a:t>1/17/2019</a:t>
+              <a:t>1/20/2019</a:t>
             </a:fld>
             <a:endParaRPr lang="en-US" dirty="0"/>
           </a:p>
@@ -1924,7 +1961,7 @@
     </p:spTree>
     <p:extLst>
       <p:ext uri="{BB962C8B-B14F-4D97-AF65-F5344CB8AC3E}">
-        <p14:creationId xmlns:p14="http://schemas.microsoft.com/office/powerpoint/2010/main" val="2692961364"/>
+        <p14:creationId xmlns:p14="http://schemas.microsoft.com/office/powerpoint/2010/main" val="745764367"/>
       </p:ext>
     </p:extLst>
   </p:cSld>
@@ -1935,7 +1972,7 @@
 </file>
 
 <file path=ppt/slideLayouts/slideLayout11.xml><?xml version="1.0" encoding="utf-8"?>
-<p:sldLayout xmlns:a="http://schemas.openxmlformats.org/drawingml/2006/main" xmlns:r="http://schemas.openxmlformats.org/officeDocument/2006/relationships" xmlns:p="http://schemas.openxmlformats.org/presentationml/2006/main" type="vertTitleAndTx" preserve="1">
+<p:sldLayout xmlns:a="http://schemas.openxmlformats.org/drawingml/2006/main" xmlns:r="http://schemas.openxmlformats.org/officeDocument/2006/relationships" xmlns:p="http://schemas.openxmlformats.org/presentationml/2006/main" showMasterSp="0" type="vertTitleAndTx" preserve="1">
   <p:cSld name="Vertical Title and Text">
     <p:spTree>
       <p:nvGrpSpPr>
@@ -1959,8 +1996,8 @@
         </p:nvSpPr>
         <p:spPr>
           <a:xfrm>
-            <a:off x="3175" y="6400800"/>
-            <a:ext cx="12188825" cy="457200"/>
+            <a:off x="2561" y="6400800"/>
+            <a:ext cx="9825654" cy="457200"/>
           </a:xfrm>
           <a:prstGeom prst="rect">
             <a:avLst/>
@@ -1997,8 +2034,8 @@
         </p:nvSpPr>
         <p:spPr>
           <a:xfrm>
-            <a:off x="15" y="6334316"/>
-            <a:ext cx="12188825" cy="64008"/>
+            <a:off x="13" y="6334316"/>
+            <a:ext cx="9825654" cy="64008"/>
           </a:xfrm>
           <a:prstGeom prst="rect">
             <a:avLst/>
@@ -2039,8 +2076,8 @@
         </p:nvSpPr>
         <p:spPr>
           <a:xfrm>
-            <a:off x="8724900" y="414778"/>
-            <a:ext cx="2628900" cy="5757421"/>
+            <a:off x="7033316" y="414780"/>
+            <a:ext cx="2119208" cy="5757421"/>
           </a:xfrm>
         </p:spPr>
         <p:txBody>
@@ -2067,8 +2104,8 @@
         </p:nvSpPr>
         <p:spPr>
           <a:xfrm>
-            <a:off x="838200" y="414778"/>
-            <a:ext cx="7734300" cy="5757422"/>
+            <a:off x="675690" y="414779"/>
+            <a:ext cx="6234773" cy="5757420"/>
           </a:xfrm>
         </p:spPr>
         <p:txBody>
@@ -2129,7 +2166,7 @@
           <a:p>
             <a:fld id="{4509A250-FF31-4206-8172-F9D3106AACB1}" type="datetimeFigureOut">
               <a:rPr lang="en-US" smtClean="0"/>
-              <a:t>1/17/2019</a:t>
+              <a:t>1/20/2019</a:t>
             </a:fld>
             <a:endParaRPr lang="en-US" dirty="0"/>
           </a:p>
@@ -2184,7 +2221,7 @@
     </p:spTree>
     <p:extLst>
       <p:ext uri="{BB962C8B-B14F-4D97-AF65-F5344CB8AC3E}">
-        <p14:creationId xmlns:p14="http://schemas.microsoft.com/office/powerpoint/2010/main" val="508014764"/>
+        <p14:creationId xmlns:p14="http://schemas.microsoft.com/office/powerpoint/2010/main" val="1438280448"/>
       </p:ext>
     </p:extLst>
   </p:cSld>
@@ -2224,11 +2261,7 @@
         <p:spPr/>
         <p:txBody>
           <a:bodyPr/>
-          <a:lstStyle>
-            <a:lvl1pPr marL="0">
-              <a:defRPr/>
-            </a:lvl1pPr>
-          </a:lstStyle>
+          <a:lstStyle/>
           <a:p>
             <a:r>
               <a:rPr lang="en-US"/>
@@ -2307,7 +2340,7 @@
           <a:p>
             <a:fld id="{4509A250-FF31-4206-8172-F9D3106AACB1}" type="datetimeFigureOut">
               <a:rPr lang="en-US" smtClean="0"/>
-              <a:t>1/17/2019</a:t>
+              <a:t>1/20/2019</a:t>
             </a:fld>
             <a:endParaRPr lang="en-US" dirty="0"/>
           </a:p>
@@ -2362,7 +2395,7 @@
     </p:spTree>
     <p:extLst>
       <p:ext uri="{BB962C8B-B14F-4D97-AF65-F5344CB8AC3E}">
-        <p14:creationId xmlns:p14="http://schemas.microsoft.com/office/powerpoint/2010/main" val="2931445012"/>
+        <p14:creationId xmlns:p14="http://schemas.microsoft.com/office/powerpoint/2010/main" val="3985139276"/>
       </p:ext>
     </p:extLst>
   </p:cSld>
@@ -2373,8 +2406,16 @@
 </file>
 
 <file path=ppt/slideLayouts/slideLayout3.xml><?xml version="1.0" encoding="utf-8"?>
-<p:sldLayout xmlns:a="http://schemas.openxmlformats.org/drawingml/2006/main" xmlns:r="http://schemas.openxmlformats.org/officeDocument/2006/relationships" xmlns:p="http://schemas.openxmlformats.org/presentationml/2006/main" type="secHead" preserve="1">
+<p:sldLayout xmlns:a="http://schemas.openxmlformats.org/drawingml/2006/main" xmlns:r="http://schemas.openxmlformats.org/officeDocument/2006/relationships" xmlns:p="http://schemas.openxmlformats.org/presentationml/2006/main" showMasterSp="0" type="secHead" preserve="1">
   <p:cSld name="Section Header">
+    <p:bg>
+      <p:bgPr>
+        <a:solidFill>
+          <a:schemeClr val="bg1"/>
+        </a:solidFill>
+        <a:effectLst/>
+      </p:bgPr>
+    </p:bg>
     <p:spTree>
       <p:nvGrpSpPr>
         <p:cNvPr id="1" name=""/>
@@ -2397,8 +2438,8 @@
         </p:nvSpPr>
         <p:spPr>
           <a:xfrm>
-            <a:off x="3175" y="6400800"/>
-            <a:ext cx="12188825" cy="457200"/>
+            <a:off x="2561" y="6400800"/>
+            <a:ext cx="9825654" cy="457200"/>
           </a:xfrm>
           <a:prstGeom prst="rect">
             <a:avLst/>
@@ -2435,8 +2476,8 @@
         </p:nvSpPr>
         <p:spPr>
           <a:xfrm>
-            <a:off x="15" y="6334316"/>
-            <a:ext cx="12188825" cy="64008"/>
+            <a:off x="13" y="6334316"/>
+            <a:ext cx="9825654" cy="64008"/>
           </a:xfrm>
           <a:prstGeom prst="rect">
             <a:avLst/>
@@ -2477,8 +2518,8 @@
         </p:nvSpPr>
         <p:spPr>
           <a:xfrm>
-            <a:off x="1097280" y="758952"/>
-            <a:ext cx="10058400" cy="3566160"/>
+            <a:off x="884539" y="758952"/>
+            <a:ext cx="8108276" cy="3566160"/>
           </a:xfrm>
         </p:spPr>
         <p:txBody>
@@ -2521,8 +2562,8 @@
         </p:nvSpPr>
         <p:spPr>
           <a:xfrm>
-            <a:off x="1097280" y="4453128"/>
-            <a:ext cx="10058400" cy="1143000"/>
+            <a:off x="884539" y="4453128"/>
+            <a:ext cx="8108276" cy="1143000"/>
           </a:xfrm>
         </p:spPr>
         <p:txBody>
@@ -2646,7 +2687,7 @@
           <a:p>
             <a:fld id="{9796027F-7875-4030-9381-8BD8C4F21935}" type="datetimeFigureOut">
               <a:rPr lang="en-US" smtClean="0"/>
-              <a:t>1/17/2019</a:t>
+              <a:t>1/20/2019</a:t>
             </a:fld>
             <a:endParaRPr lang="en-US"/>
           </a:p>
@@ -2706,8 +2747,8 @@
         </p:nvCxnSpPr>
         <p:spPr>
           <a:xfrm>
-            <a:off x="1207658" y="4343400"/>
-            <a:ext cx="9875520" cy="0"/>
+            <a:off x="973517" y="4343400"/>
+            <a:ext cx="7960853" cy="0"/>
           </a:xfrm>
           <a:prstGeom prst="line">
             <a:avLst/>
@@ -2739,7 +2780,7 @@
     </p:spTree>
     <p:extLst>
       <p:ext uri="{BB962C8B-B14F-4D97-AF65-F5344CB8AC3E}">
-        <p14:creationId xmlns:p14="http://schemas.microsoft.com/office/powerpoint/2010/main" val="2792161855"/>
+        <p14:creationId xmlns:p14="http://schemas.microsoft.com/office/powerpoint/2010/main" val="196470169"/>
       </p:ext>
     </p:extLst>
   </p:cSld>
@@ -2778,8 +2819,8 @@
         </p:nvSpPr>
         <p:spPr>
           <a:xfrm>
-            <a:off x="1097280" y="286603"/>
-            <a:ext cx="10058400" cy="1450757"/>
+            <a:off x="884539" y="286605"/>
+            <a:ext cx="8108276" cy="1450757"/>
           </a:xfrm>
         </p:spPr>
         <p:txBody>
@@ -2806,8 +2847,8 @@
         </p:nvSpPr>
         <p:spPr>
           <a:xfrm>
-            <a:off x="1097279" y="1845734"/>
-            <a:ext cx="4937760" cy="4023360"/>
+            <a:off x="884539" y="1845734"/>
+            <a:ext cx="3980426" cy="4023360"/>
           </a:xfrm>
         </p:spPr>
         <p:txBody>
@@ -2863,8 +2904,8 @@
         </p:nvSpPr>
         <p:spPr>
           <a:xfrm>
-            <a:off x="6217920" y="1845735"/>
-            <a:ext cx="4937760" cy="4023360"/>
+            <a:off x="5012389" y="1845737"/>
+            <a:ext cx="3980426" cy="4023359"/>
           </a:xfrm>
         </p:spPr>
         <p:txBody>
@@ -2925,7 +2966,7 @@
           <a:p>
             <a:fld id="{9796027F-7875-4030-9381-8BD8C4F21935}" type="datetimeFigureOut">
               <a:rPr lang="en-US" smtClean="0"/>
-              <a:t>1/17/2019</a:t>
+              <a:t>1/20/2019</a:t>
             </a:fld>
             <a:endParaRPr lang="en-US"/>
           </a:p>
@@ -2980,7 +3021,7 @@
     </p:spTree>
     <p:extLst>
       <p:ext uri="{BB962C8B-B14F-4D97-AF65-F5344CB8AC3E}">
-        <p14:creationId xmlns:p14="http://schemas.microsoft.com/office/powerpoint/2010/main" val="2911585295"/>
+        <p14:creationId xmlns:p14="http://schemas.microsoft.com/office/powerpoint/2010/main" val="3704209514"/>
       </p:ext>
     </p:extLst>
   </p:cSld>
@@ -3019,8 +3060,8 @@
         </p:nvSpPr>
         <p:spPr>
           <a:xfrm>
-            <a:off x="1097280" y="286603"/>
-            <a:ext cx="10058400" cy="1450757"/>
+            <a:off x="884539" y="286605"/>
+            <a:ext cx="8108276" cy="1450757"/>
           </a:xfrm>
         </p:spPr>
         <p:txBody>
@@ -3047,8 +3088,8 @@
         </p:nvSpPr>
         <p:spPr>
           <a:xfrm>
-            <a:off x="1097280" y="1846052"/>
-            <a:ext cx="4937760" cy="736282"/>
+            <a:off x="884539" y="1846052"/>
+            <a:ext cx="3980426" cy="736282"/>
           </a:xfrm>
         </p:spPr>
         <p:txBody>
@@ -3118,8 +3159,8 @@
         </p:nvSpPr>
         <p:spPr>
           <a:xfrm>
-            <a:off x="1097280" y="2582334"/>
-            <a:ext cx="4937760" cy="3378200"/>
+            <a:off x="884539" y="2582334"/>
+            <a:ext cx="3980426" cy="3286760"/>
           </a:xfrm>
         </p:spPr>
         <p:txBody>
@@ -3175,8 +3216,8 @@
         </p:nvSpPr>
         <p:spPr>
           <a:xfrm>
-            <a:off x="6217920" y="1846052"/>
-            <a:ext cx="4937760" cy="736282"/>
+            <a:off x="5012389" y="1846052"/>
+            <a:ext cx="3980426" cy="736282"/>
           </a:xfrm>
         </p:spPr>
         <p:txBody>
@@ -3246,8 +3287,8 @@
         </p:nvSpPr>
         <p:spPr>
           <a:xfrm>
-            <a:off x="6217920" y="2582334"/>
-            <a:ext cx="4937760" cy="3378200"/>
+            <a:off x="5012389" y="2582334"/>
+            <a:ext cx="3980426" cy="3286760"/>
           </a:xfrm>
         </p:spPr>
         <p:txBody>
@@ -3308,7 +3349,7 @@
           <a:p>
             <a:fld id="{9796027F-7875-4030-9381-8BD8C4F21935}" type="datetimeFigureOut">
               <a:rPr lang="en-US" smtClean="0"/>
-              <a:t>1/17/2019</a:t>
+              <a:t>1/20/2019</a:t>
             </a:fld>
             <a:endParaRPr lang="en-US"/>
           </a:p>
@@ -3363,7 +3404,7 @@
     </p:spTree>
     <p:extLst>
       <p:ext uri="{BB962C8B-B14F-4D97-AF65-F5344CB8AC3E}">
-        <p14:creationId xmlns:p14="http://schemas.microsoft.com/office/powerpoint/2010/main" val="3019401893"/>
+        <p14:creationId xmlns:p14="http://schemas.microsoft.com/office/powerpoint/2010/main" val="1876584410"/>
       </p:ext>
     </p:extLst>
   </p:cSld>
@@ -3406,9 +3447,10 @@
           <a:lstStyle/>
           <a:p>
             <a:r>
-              <a:rPr lang="en-US" dirty="0"/>
+              <a:rPr lang="en-US"/>
               <a:t>Click to edit Master title style</a:t>
             </a:r>
+            <a:endParaRPr lang="en-US" dirty="0"/>
           </a:p>
         </p:txBody>
       </p:sp>
@@ -3429,7 +3471,7 @@
           <a:p>
             <a:fld id="{4509A250-FF31-4206-8172-F9D3106AACB1}" type="datetimeFigureOut">
               <a:rPr lang="en-US" smtClean="0"/>
-              <a:t>1/17/2019</a:t>
+              <a:t>1/20/2019</a:t>
             </a:fld>
             <a:endParaRPr lang="en-US" dirty="0"/>
           </a:p>
@@ -3484,7 +3526,7 @@
     </p:spTree>
     <p:extLst>
       <p:ext uri="{BB962C8B-B14F-4D97-AF65-F5344CB8AC3E}">
-        <p14:creationId xmlns:p14="http://schemas.microsoft.com/office/powerpoint/2010/main" val="1479142057"/>
+        <p14:creationId xmlns:p14="http://schemas.microsoft.com/office/powerpoint/2010/main" val="3728807695"/>
       </p:ext>
     </p:extLst>
   </p:cSld>
@@ -3495,16 +3537,8 @@
 </file>
 
 <file path=ppt/slideLayouts/slideLayout7.xml><?xml version="1.0" encoding="utf-8"?>
-<p:sldLayout xmlns:a="http://schemas.openxmlformats.org/drawingml/2006/main" xmlns:r="http://schemas.openxmlformats.org/officeDocument/2006/relationships" xmlns:p="http://schemas.openxmlformats.org/presentationml/2006/main" type="blank" preserve="1">
+<p:sldLayout xmlns:a="http://schemas.openxmlformats.org/drawingml/2006/main" xmlns:r="http://schemas.openxmlformats.org/officeDocument/2006/relationships" xmlns:p="http://schemas.openxmlformats.org/presentationml/2006/main" showMasterSp="0" type="blank" preserve="1">
   <p:cSld name="Blank">
-    <p:bg>
-      <p:bgPr>
-        <a:solidFill>
-          <a:schemeClr val="bg1"/>
-        </a:solidFill>
-        <a:effectLst/>
-      </p:bgPr>
-    </p:bg>
     <p:spTree>
       <p:nvGrpSpPr>
         <p:cNvPr id="1" name=""/>
@@ -3527,8 +3561,8 @@
         </p:nvSpPr>
         <p:spPr>
           <a:xfrm>
-            <a:off x="3175" y="6400800"/>
-            <a:ext cx="12188825" cy="457200"/>
+            <a:off x="2561" y="6400800"/>
+            <a:ext cx="9825654" cy="457200"/>
           </a:xfrm>
           <a:prstGeom prst="rect">
             <a:avLst/>
@@ -3565,8 +3599,8 @@
         </p:nvSpPr>
         <p:spPr>
           <a:xfrm>
-            <a:off x="15" y="6334316"/>
-            <a:ext cx="12188825" cy="64008"/>
+            <a:off x="13" y="6334316"/>
+            <a:ext cx="9825654" cy="64008"/>
           </a:xfrm>
           <a:prstGeom prst="rect">
             <a:avLst/>
@@ -3612,7 +3646,7 @@
           <a:p>
             <a:fld id="{4509A250-FF31-4206-8172-F9D3106AACB1}" type="datetimeFigureOut">
               <a:rPr lang="en-US" smtClean="0"/>
-              <a:t>1/17/2019</a:t>
+              <a:t>1/20/2019</a:t>
             </a:fld>
             <a:endParaRPr lang="en-US" dirty="0"/>
           </a:p>
@@ -3675,7 +3709,7 @@
     </p:spTree>
     <p:extLst>
       <p:ext uri="{BB962C8B-B14F-4D97-AF65-F5344CB8AC3E}">
-        <p14:creationId xmlns:p14="http://schemas.microsoft.com/office/powerpoint/2010/main" val="352349723"/>
+        <p14:creationId xmlns:p14="http://schemas.microsoft.com/office/powerpoint/2010/main" val="3948107553"/>
       </p:ext>
     </p:extLst>
   </p:cSld>
@@ -3686,7 +3720,7 @@
 </file>
 
 <file path=ppt/slideLayouts/slideLayout8.xml><?xml version="1.0" encoding="utf-8"?>
-<p:sldLayout xmlns:a="http://schemas.openxmlformats.org/drawingml/2006/main" xmlns:r="http://schemas.openxmlformats.org/officeDocument/2006/relationships" xmlns:p="http://schemas.openxmlformats.org/presentationml/2006/main" type="objTx" preserve="1">
+<p:sldLayout xmlns:a="http://schemas.openxmlformats.org/drawingml/2006/main" xmlns:r="http://schemas.openxmlformats.org/officeDocument/2006/relationships" xmlns:p="http://schemas.openxmlformats.org/presentationml/2006/main" showMasterSp="0" type="objTx" preserve="1">
   <p:cSld name="Content with Caption">
     <p:spTree>
       <p:nvGrpSpPr>
@@ -3710,8 +3744,8 @@
         </p:nvSpPr>
         <p:spPr>
           <a:xfrm>
-            <a:off x="16" y="0"/>
-            <a:ext cx="4050791" cy="6858000"/>
+            <a:off x="14" y="0"/>
+            <a:ext cx="3265423" cy="6858000"/>
           </a:xfrm>
           <a:prstGeom prst="rect">
             <a:avLst/>
@@ -3748,8 +3782,8 @@
         </p:nvSpPr>
         <p:spPr>
           <a:xfrm>
-            <a:off x="4040071" y="0"/>
-            <a:ext cx="64008" cy="6858000"/>
+            <a:off x="3256781" y="0"/>
+            <a:ext cx="51598" cy="6858000"/>
           </a:xfrm>
           <a:prstGeom prst="rect">
             <a:avLst/>
@@ -3790,8 +3824,8 @@
         </p:nvSpPr>
         <p:spPr>
           <a:xfrm>
-            <a:off x="457200" y="594359"/>
-            <a:ext cx="3200400" cy="2286000"/>
+            <a:off x="368558" y="594359"/>
+            <a:ext cx="2579906" cy="2286000"/>
           </a:xfrm>
         </p:spPr>
         <p:txBody>
@@ -3828,8 +3862,8 @@
         </p:nvSpPr>
         <p:spPr>
           <a:xfrm>
-            <a:off x="4800600" y="731520"/>
-            <a:ext cx="6492240" cy="5257800"/>
+            <a:off x="3719155" y="731520"/>
+            <a:ext cx="5384228" cy="5257800"/>
           </a:xfrm>
         </p:spPr>
         <p:txBody>
@@ -3885,8 +3919,8 @@
         </p:nvSpPr>
         <p:spPr>
           <a:xfrm>
-            <a:off x="457200" y="2926080"/>
-            <a:ext cx="3200400" cy="3379124"/>
+            <a:off x="368558" y="2926080"/>
+            <a:ext cx="2579906" cy="3379124"/>
           </a:xfrm>
         </p:spPr>
         <p:txBody>
@@ -3956,8 +3990,8 @@
         </p:nvSpPr>
         <p:spPr>
           <a:xfrm>
-            <a:off x="465512" y="6459785"/>
-            <a:ext cx="2618510" cy="365125"/>
+            <a:off x="375259" y="6459787"/>
+            <a:ext cx="2110833" cy="365125"/>
           </a:xfrm>
         </p:spPr>
         <p:txBody>
@@ -3970,7 +4004,7 @@
           <a:p>
             <a:fld id="{4509A250-FF31-4206-8172-F9D3106AACB1}" type="datetimeFigureOut">
               <a:rPr lang="en-US" smtClean="0"/>
-              <a:t>1/17/2019</a:t>
+              <a:t>1/20/2019</a:t>
             </a:fld>
             <a:endParaRPr lang="en-US" dirty="0"/>
           </a:p>
@@ -3988,8 +4022,8 @@
         </p:nvSpPr>
         <p:spPr>
           <a:xfrm>
-            <a:off x="4800600" y="6459785"/>
-            <a:ext cx="4648200" cy="365125"/>
+            <a:off x="3869859" y="6459787"/>
+            <a:ext cx="3747006" cy="365125"/>
           </a:xfrm>
         </p:spPr>
         <p:txBody>
@@ -4046,7 +4080,7 @@
     </p:spTree>
     <p:extLst>
       <p:ext uri="{BB962C8B-B14F-4D97-AF65-F5344CB8AC3E}">
-        <p14:creationId xmlns:p14="http://schemas.microsoft.com/office/powerpoint/2010/main" val="2311774805"/>
+        <p14:creationId xmlns:p14="http://schemas.microsoft.com/office/powerpoint/2010/main" val="303919510"/>
       </p:ext>
     </p:extLst>
   </p:cSld>
@@ -4057,7 +4091,7 @@
 </file>
 
 <file path=ppt/slideLayouts/slideLayout9.xml><?xml version="1.0" encoding="utf-8"?>
-<p:sldLayout xmlns:a="http://schemas.openxmlformats.org/drawingml/2006/main" xmlns:r="http://schemas.openxmlformats.org/officeDocument/2006/relationships" xmlns:p="http://schemas.openxmlformats.org/presentationml/2006/main" type="picTx" preserve="1">
+<p:sldLayout xmlns:a="http://schemas.openxmlformats.org/drawingml/2006/main" xmlns:r="http://schemas.openxmlformats.org/officeDocument/2006/relationships" xmlns:p="http://schemas.openxmlformats.org/presentationml/2006/main" showMasterSp="0" type="picTx" preserve="1">
   <p:cSld name="Picture with Caption">
     <p:spTree>
       <p:nvGrpSpPr>
@@ -4082,7 +4116,7 @@
         <p:spPr>
           <a:xfrm>
             <a:off x="0" y="4953000"/>
-            <a:ext cx="12188825" cy="1905000"/>
+            <a:ext cx="9825654" cy="1905000"/>
           </a:xfrm>
           <a:prstGeom prst="rect">
             <a:avLst/>
@@ -4119,8 +4153,8 @@
         </p:nvSpPr>
         <p:spPr>
           <a:xfrm>
-            <a:off x="15" y="4915076"/>
-            <a:ext cx="12188825" cy="64008"/>
+            <a:off x="13" y="4915076"/>
+            <a:ext cx="9825654" cy="64008"/>
           </a:xfrm>
           <a:prstGeom prst="rect">
             <a:avLst/>
@@ -4161,12 +4195,12 @@
         </p:nvSpPr>
         <p:spPr>
           <a:xfrm>
-            <a:off x="1097280" y="5074920"/>
-            <a:ext cx="10113264" cy="822960"/>
+            <a:off x="884539" y="5074920"/>
+            <a:ext cx="8157417" cy="822960"/>
           </a:xfrm>
         </p:spPr>
         <p:txBody>
-          <a:bodyPr lIns="91440" tIns="0" rIns="91440" bIns="0" anchor="b">
+          <a:bodyPr tIns="0" bIns="0" anchor="b">
             <a:noAutofit/>
           </a:bodyPr>
           <a:lstStyle>
@@ -4199,8 +4233,8 @@
         </p:nvSpPr>
         <p:spPr>
           <a:xfrm>
-            <a:off x="15" y="0"/>
-            <a:ext cx="12191985" cy="4915076"/>
+            <a:off x="14" y="0"/>
+            <a:ext cx="9828201" cy="4915076"/>
           </a:xfrm>
           <a:blipFill>
             <a:blip r:embed="rId2"/>
@@ -4274,8 +4308,8 @@
         </p:nvSpPr>
         <p:spPr>
           <a:xfrm>
-            <a:off x="1097280" y="5907023"/>
-            <a:ext cx="10113264" cy="594360"/>
+            <a:off x="884538" y="5907024"/>
+            <a:ext cx="8157417" cy="594360"/>
           </a:xfrm>
         </p:spPr>
         <p:txBody>
@@ -4356,7 +4390,7 @@
           <a:p>
             <a:fld id="{4509A250-FF31-4206-8172-F9D3106AACB1}" type="datetimeFigureOut">
               <a:rPr lang="en-US" smtClean="0"/>
-              <a:t>1/17/2019</a:t>
+              <a:t>1/20/2019</a:t>
             </a:fld>
             <a:endParaRPr lang="en-US" dirty="0"/>
           </a:p>
@@ -4411,7 +4445,7 @@
     </p:spTree>
     <p:extLst>
       <p:ext uri="{BB962C8B-B14F-4D97-AF65-F5344CB8AC3E}">
-        <p14:creationId xmlns:p14="http://schemas.microsoft.com/office/powerpoint/2010/main" val="3869343076"/>
+        <p14:creationId xmlns:p14="http://schemas.microsoft.com/office/powerpoint/2010/main" val="1758350286"/>
       </p:ext>
     </p:extLst>
   </p:cSld>
@@ -4425,12 +4459,9 @@
 <p:sldMaster xmlns:a="http://schemas.openxmlformats.org/drawingml/2006/main" xmlns:r="http://schemas.openxmlformats.org/officeDocument/2006/relationships" xmlns:p="http://schemas.openxmlformats.org/presentationml/2006/main">
   <p:cSld>
     <p:bg>
-      <p:bgPr>
-        <a:solidFill>
-          <a:schemeClr val="bg1"/>
-        </a:solidFill>
-        <a:effectLst/>
-      </p:bgPr>
+      <p:bgRef idx="1001">
+        <a:schemeClr val="bg1"/>
+      </p:bgRef>
     </p:bg>
     <p:spTree>
       <p:nvGrpSpPr>
@@ -4455,7 +4486,7 @@
         <p:spPr>
           <a:xfrm>
             <a:off x="1" y="6400800"/>
-            <a:ext cx="12192000" cy="457200"/>
+            <a:ext cx="9828214" cy="457200"/>
           </a:xfrm>
           <a:prstGeom prst="rect">
             <a:avLst/>
@@ -4492,8 +4523,8 @@
         </p:nvSpPr>
         <p:spPr>
           <a:xfrm>
-            <a:off x="0" y="6334316"/>
-            <a:ext cx="12192001" cy="65998"/>
+            <a:off x="1" y="6334316"/>
+            <a:ext cx="9828214" cy="65999"/>
           </a:xfrm>
           <a:prstGeom prst="rect">
             <a:avLst/>
@@ -4534,8 +4565,8 @@
         </p:nvSpPr>
         <p:spPr>
           <a:xfrm>
-            <a:off x="1097280" y="286603"/>
-            <a:ext cx="10058400" cy="1450757"/>
+            <a:off x="884539" y="286605"/>
+            <a:ext cx="8108276" cy="1450757"/>
           </a:xfrm>
           <a:prstGeom prst="rect">
             <a:avLst/>
@@ -4567,8 +4598,8 @@
         </p:nvSpPr>
         <p:spPr>
           <a:xfrm>
-            <a:off x="1097280" y="1845734"/>
-            <a:ext cx="10058400" cy="4023360"/>
+            <a:off x="884539" y="1845734"/>
+            <a:ext cx="8108277" cy="4023360"/>
           </a:xfrm>
           <a:prstGeom prst="rect">
             <a:avLst/>
@@ -4629,8 +4660,8 @@
         </p:nvSpPr>
         <p:spPr>
           <a:xfrm>
-            <a:off x="1097280" y="6459785"/>
-            <a:ext cx="2472271" cy="365125"/>
+            <a:off x="884541" y="6459787"/>
+            <a:ext cx="1992946" cy="365125"/>
           </a:xfrm>
           <a:prstGeom prst="rect">
             <a:avLst/>
@@ -4651,7 +4682,7 @@
             <a:fld id="{4AAD347D-5ACD-4C99-B74B-A9C85AD731AF}" type="datetimeFigureOut">
               <a:rPr lang="en-US" smtClean="0"/>
               <a:pPr/>
-              <a:t>1/17/2019</a:t>
+              <a:t>1/20/2019</a:t>
             </a:fld>
             <a:endParaRPr lang="en-US" dirty="0"/>
           </a:p>
@@ -4669,8 +4700,8 @@
         </p:nvSpPr>
         <p:spPr>
           <a:xfrm>
-            <a:off x="3686185" y="6459785"/>
-            <a:ext cx="4822804" cy="365125"/>
+            <a:off x="2971508" y="6459787"/>
+            <a:ext cx="3887758" cy="365125"/>
           </a:xfrm>
           <a:prstGeom prst="rect">
             <a:avLst/>
@@ -4708,8 +4739,8 @@
         </p:nvSpPr>
         <p:spPr>
           <a:xfrm>
-            <a:off x="9900458" y="6459785"/>
-            <a:ext cx="1312025" cy="365125"/>
+            <a:off x="7980956" y="6459787"/>
+            <a:ext cx="1057650" cy="365125"/>
           </a:xfrm>
           <a:prstGeom prst="rect">
             <a:avLst/>
@@ -4743,8 +4774,8 @@
         </p:nvCxnSpPr>
         <p:spPr>
           <a:xfrm>
-            <a:off x="1193532" y="1737845"/>
-            <a:ext cx="9966960" cy="0"/>
+            <a:off x="962130" y="1737845"/>
+            <a:ext cx="8034564" cy="0"/>
           </a:xfrm>
           <a:prstGeom prst="line">
             <a:avLst/>
@@ -4775,10 +4806,10 @@
       </p:cxnSp>
       <p:pic>
         <p:nvPicPr>
-          <p:cNvPr id="15" name="Picture 14">
+          <p:cNvPr id="11" name="Picture 10">
             <a:extLst>
               <a:ext uri="{FF2B5EF4-FFF2-40B4-BE49-F238E27FC236}">
-                <a16:creationId xmlns:a16="http://schemas.microsoft.com/office/drawing/2014/main" id="{BD50875A-DF42-4EFC-8A0D-FBC2023203FA}"/>
+                <a16:creationId xmlns:a16="http://schemas.microsoft.com/office/drawing/2014/main" id="{0F1C8D83-BF1C-455B-B8D9-198B9A3AB972}"/>
               </a:ext>
             </a:extLst>
           </p:cNvPr>
@@ -4800,8 +4831,8 @@
         </p:blipFill>
         <p:spPr>
           <a:xfrm>
-            <a:off x="8605878" y="6096000"/>
-            <a:ext cx="993734" cy="762000"/>
+            <a:off x="6937369" y="6096000"/>
+            <a:ext cx="801069" cy="762000"/>
           </a:xfrm>
           <a:prstGeom prst="rect">
             <a:avLst/>
@@ -4810,10 +4841,10 @@
       </p:pic>
       <p:sp>
         <p:nvSpPr>
-          <p:cNvPr id="16" name="Rectangle 15">
+          <p:cNvPr id="12" name="Rectangle 11">
             <a:extLst>
               <a:ext uri="{FF2B5EF4-FFF2-40B4-BE49-F238E27FC236}">
-                <a16:creationId xmlns:a16="http://schemas.microsoft.com/office/drawing/2014/main" id="{C002FA68-A171-475A-A27A-39EB91F29769}"/>
+                <a16:creationId xmlns:a16="http://schemas.microsoft.com/office/drawing/2014/main" id="{83A15F3F-71E5-4197-B9C4-0715587EC6C9}"/>
               </a:ext>
             </a:extLst>
           </p:cNvPr>
@@ -4822,8 +4853,8 @@
         </p:nvSpPr>
         <p:spPr bwMode="blackWhite">
           <a:xfrm>
-            <a:off x="10437812" y="0"/>
-            <a:ext cx="685800" cy="1143000"/>
+            <a:off x="8414127" y="0"/>
+            <a:ext cx="552837" cy="1143000"/>
           </a:xfrm>
           <a:prstGeom prst="rect">
             <a:avLst/>
@@ -4854,30 +4885,30 @@
           <a:lstStyle/>
           <a:p>
             <a:pPr algn="ctr"/>
-            <a:endParaRPr lang="en-US"/>
+            <a:endParaRPr lang="en-US" sz="1350"/>
           </a:p>
         </p:txBody>
       </p:sp>
     </p:spTree>
     <p:extLst>
       <p:ext uri="{BB962C8B-B14F-4D97-AF65-F5344CB8AC3E}">
-        <p14:creationId xmlns:p14="http://schemas.microsoft.com/office/powerpoint/2010/main" val="2773364120"/>
+        <p14:creationId xmlns:p14="http://schemas.microsoft.com/office/powerpoint/2010/main" val="2988143748"/>
       </p:ext>
     </p:extLst>
   </p:cSld>
   <p:clrMap bg1="lt1" tx1="dk1" bg2="lt2" tx2="dk2" accent1="accent1" accent2="accent2" accent3="accent3" accent4="accent4" accent5="accent5" accent6="accent6" hlink="hlink" folHlink="folHlink"/>
   <p:sldLayoutIdLst>
-    <p:sldLayoutId id="2147483672" r:id="rId1"/>
-    <p:sldLayoutId id="2147483673" r:id="rId2"/>
-    <p:sldLayoutId id="2147483674" r:id="rId3"/>
-    <p:sldLayoutId id="2147483675" r:id="rId4"/>
-    <p:sldLayoutId id="2147483676" r:id="rId5"/>
-    <p:sldLayoutId id="2147483677" r:id="rId6"/>
-    <p:sldLayoutId id="2147483678" r:id="rId7"/>
-    <p:sldLayoutId id="2147483679" r:id="rId8"/>
-    <p:sldLayoutId id="2147483680" r:id="rId9"/>
-    <p:sldLayoutId id="2147483681" r:id="rId10"/>
-    <p:sldLayoutId id="2147483682" r:id="rId11"/>
+    <p:sldLayoutId id="2147483696" r:id="rId1"/>
+    <p:sldLayoutId id="2147483697" r:id="rId2"/>
+    <p:sldLayoutId id="2147483698" r:id="rId3"/>
+    <p:sldLayoutId id="2147483699" r:id="rId4"/>
+    <p:sldLayoutId id="2147483700" r:id="rId5"/>
+    <p:sldLayoutId id="2147483701" r:id="rId6"/>
+    <p:sldLayoutId id="2147483702" r:id="rId7"/>
+    <p:sldLayoutId id="2147483703" r:id="rId8"/>
+    <p:sldLayoutId id="2147483704" r:id="rId9"/>
+    <p:sldLayoutId id="2147483705" r:id="rId10"/>
+    <p:sldLayoutId id="2147483706" r:id="rId11"/>
   </p:sldLayoutIdLst>
   <p:hf sldNum="0" hdr="0" ftr="0" dt="0"/>
   <p:txStyles>
@@ -5389,57 +5420,57 @@
           <a:bodyPr anchor="ctr"/>
           <a:lstStyle/>
           <a:p>
-            <a:pPr marL="355600" indent="-220663">
+            <a:pPr marL="266700" indent="-165497">
               <a:buFont typeface="Arial" panose="020B0604020202020204" pitchFamily="34" charset="0"/>
               <a:buChar char="•"/>
             </a:pPr>
             <a:r>
-              <a:rPr lang="en-US" sz="2800" dirty="0"/>
+              <a:rPr lang="en-US" sz="2100" dirty="0"/>
               <a:t>General Information</a:t>
             </a:r>
           </a:p>
           <a:p>
-            <a:pPr marL="355600" indent="-220663">
+            <a:pPr marL="266700" indent="-165497">
               <a:buFont typeface="Arial" panose="020B0604020202020204" pitchFamily="34" charset="0"/>
               <a:buChar char="•"/>
             </a:pPr>
             <a:r>
-              <a:rPr lang="en-US" sz="2800" dirty="0"/>
+              <a:rPr lang="en-US" sz="2100" dirty="0"/>
               <a:t>Mathematical Models</a:t>
             </a:r>
           </a:p>
           <a:p>
-            <a:pPr marL="355600" indent="-220663">
+            <a:pPr marL="266700" indent="-165497">
               <a:buFont typeface="Arial" panose="020B0604020202020204" pitchFamily="34" charset="0"/>
               <a:buChar char="•"/>
             </a:pPr>
             <a:r>
-              <a:rPr lang="en-US" sz="2800" dirty="0"/>
+              <a:rPr lang="en-US" sz="2100" dirty="0"/>
               <a:t>UML</a:t>
             </a:r>
           </a:p>
           <a:p>
-            <a:pPr marL="355600" indent="-220663">
+            <a:pPr marL="266700" indent="-165497">
               <a:buFont typeface="Arial" panose="020B0604020202020204" pitchFamily="34" charset="0"/>
               <a:buChar char="•"/>
             </a:pPr>
             <a:r>
-              <a:rPr lang="en-US" sz="2800" dirty="0"/>
+              <a:rPr lang="en-US" sz="2100" dirty="0"/>
               <a:t>Application</a:t>
             </a:r>
           </a:p>
           <a:p>
-            <a:pPr marL="355600" indent="-220663">
+            <a:pPr marL="266700" indent="-165497">
               <a:buFont typeface="Arial" panose="020B0604020202020204" pitchFamily="34" charset="0"/>
               <a:buChar char="•"/>
             </a:pPr>
             <a:r>
-              <a:rPr lang="en-US" sz="2800" dirty="0"/>
+              <a:rPr lang="en-US" sz="2100" dirty="0"/>
               <a:t>Summary and Conclusion</a:t>
             </a:r>
           </a:p>
           <a:p>
-            <a:pPr marL="361950" indent="-227013">
+            <a:pPr marL="271463" indent="-170260">
               <a:buFont typeface="Arial" panose="020B0604020202020204" pitchFamily="34" charset="0"/>
               <a:buChar char="•"/>
             </a:pPr>
@@ -5518,32 +5549,32 @@
           <a:bodyPr anchor="ctr"/>
           <a:lstStyle/>
           <a:p>
-            <a:pPr marL="355600" indent="-220663">
+            <a:pPr marL="266700" indent="-165497">
               <a:buFont typeface="Arial" panose="020B0604020202020204" pitchFamily="34" charset="0"/>
               <a:buChar char="•"/>
             </a:pPr>
             <a:r>
-              <a:rPr lang="en-US" sz="2800" dirty="0"/>
+              <a:rPr lang="en-US" sz="2100" dirty="0"/>
               <a:t>Project Plan</a:t>
             </a:r>
           </a:p>
           <a:p>
-            <a:pPr marL="355600" indent="-220663">
+            <a:pPr marL="266700" indent="-165497">
               <a:buFont typeface="Arial" panose="020B0604020202020204" pitchFamily="34" charset="0"/>
               <a:buChar char="•"/>
             </a:pPr>
             <a:r>
-              <a:rPr lang="en-US" sz="2800" dirty="0"/>
+              <a:rPr lang="en-US" sz="2100" dirty="0"/>
               <a:t>Meetings</a:t>
             </a:r>
           </a:p>
           <a:p>
-            <a:pPr marL="355600" indent="-220663">
+            <a:pPr marL="266700" indent="-165497">
               <a:buFont typeface="Arial" panose="020B0604020202020204" pitchFamily="34" charset="0"/>
               <a:buChar char="•"/>
             </a:pPr>
             <a:r>
-              <a:rPr lang="en-US" sz="2800" dirty="0"/>
+              <a:rPr lang="en-US" sz="2100" dirty="0"/>
               <a:t>Agendas and Minutes</a:t>
             </a:r>
           </a:p>
@@ -5600,8 +5631,8 @@
         </p:nvSpPr>
         <p:spPr>
           <a:xfrm>
-            <a:off x="942975" y="1371600"/>
-            <a:ext cx="10734675" cy="866775"/>
+            <a:off x="888603" y="1506390"/>
+            <a:ext cx="8324408" cy="650081"/>
           </a:xfrm>
           <a:prstGeom prst="rect">
             <a:avLst/>
@@ -5634,7 +5665,7 @@
           <a:lstStyle/>
           <a:p>
             <a:pPr algn="ctr"/>
-            <a:endParaRPr lang="en-AU"/>
+            <a:endParaRPr lang="en-AU" sz="1350"/>
           </a:p>
         </p:txBody>
       </p:sp>
@@ -5660,8 +5691,8 @@
         </p:blipFill>
         <p:spPr>
           <a:xfrm>
-            <a:off x="2064229" y="142875"/>
-            <a:ext cx="6693445" cy="6010275"/>
+            <a:off x="1890278" y="964407"/>
+            <a:ext cx="5020084" cy="4507706"/>
           </a:xfrm>
           <a:prstGeom prst="rect">
             <a:avLst/>
@@ -5710,8 +5741,8 @@
         </p:nvSpPr>
         <p:spPr>
           <a:xfrm>
-            <a:off x="1097280" y="286603"/>
-            <a:ext cx="9502987" cy="1450757"/>
+            <a:off x="1259958" y="640882"/>
+            <a:ext cx="7127240" cy="1088068"/>
           </a:xfrm>
         </p:spPr>
         <p:txBody>
@@ -5722,7 +5753,7 @@
           <a:p>
             <a:pPr algn="ctr"/>
             <a:r>
-              <a:rPr lang="en-US" sz="3400" i="1" dirty="0"/>
+              <a:rPr lang="en-US" sz="2550" i="1" dirty="0"/>
               <a:t>What is the best ethically acceptable measure which can be taken to improve the ecological balance in the Oostvaardersplassen?</a:t>
             </a:r>
           </a:p>
@@ -5743,52 +5774,52 @@
           <a:bodyPr anchor="ctr"/>
           <a:lstStyle/>
           <a:p>
-            <a:pPr marL="355600" indent="-220663">
+            <a:pPr marL="266700" indent="-165497">
               <a:buFont typeface="Arial" panose="020B0604020202020204" pitchFamily="34" charset="0"/>
               <a:buChar char="•"/>
             </a:pPr>
             <a:r>
-              <a:rPr lang="en-US" sz="2800" dirty="0"/>
+              <a:rPr lang="en-US" sz="2100" dirty="0"/>
               <a:t>Needs of the client</a:t>
             </a:r>
           </a:p>
           <a:p>
-            <a:pPr marL="355600" indent="-220663">
+            <a:pPr marL="266700" indent="-165497">
               <a:buFont typeface="Arial" panose="020B0604020202020204" pitchFamily="34" charset="0"/>
               <a:buChar char="•"/>
             </a:pPr>
             <a:r>
-              <a:rPr lang="en-US" sz="2800" dirty="0"/>
+              <a:rPr lang="en-US" sz="2100" dirty="0"/>
               <a:t>Available models</a:t>
             </a:r>
           </a:p>
           <a:p>
-            <a:pPr marL="355600" indent="-220663">
+            <a:pPr marL="266700" indent="-165497">
               <a:buFont typeface="Arial" panose="020B0604020202020204" pitchFamily="34" charset="0"/>
               <a:buChar char="•"/>
             </a:pPr>
             <a:r>
-              <a:rPr lang="en-US" sz="2800" dirty="0"/>
+              <a:rPr lang="en-US" sz="2100" dirty="0"/>
               <a:t>Variables to be used</a:t>
             </a:r>
           </a:p>
           <a:p>
-            <a:pPr marL="355600" indent="-220663">
+            <a:pPr marL="266700" indent="-165497">
               <a:buFont typeface="Arial" panose="020B0604020202020204" pitchFamily="34" charset="0"/>
               <a:buChar char="•"/>
             </a:pPr>
             <a:r>
-              <a:rPr lang="en-US" sz="2800" dirty="0"/>
+              <a:rPr lang="en-US" sz="2100" dirty="0"/>
               <a:t>Models simple enough</a:t>
             </a:r>
           </a:p>
           <a:p>
-            <a:pPr marL="355600" indent="-220663">
+            <a:pPr marL="266700" indent="-165497">
               <a:buFont typeface="Arial" panose="020B0604020202020204" pitchFamily="34" charset="0"/>
               <a:buChar char="•"/>
             </a:pPr>
             <a:r>
-              <a:rPr lang="en-US" sz="2800" dirty="0"/>
+              <a:rPr lang="en-US" sz="2100" dirty="0"/>
               <a:t>Application</a:t>
             </a:r>
           </a:p>
@@ -5870,12 +5901,12 @@
           <a:bodyPr anchor="ctr"/>
           <a:lstStyle/>
           <a:p>
-            <a:pPr marL="355600" indent="-220663">
+            <a:pPr marL="266700" indent="-165497">
               <a:buFont typeface="Arial" panose="020B0604020202020204" pitchFamily="34" charset="0"/>
               <a:buChar char="•"/>
             </a:pPr>
             <a:r>
-              <a:rPr lang="en-US" sz="2800" dirty="0"/>
+              <a:rPr lang="en-US" sz="2100" dirty="0"/>
               <a:t>Sample data blah blah</a:t>
             </a:r>
             <a:endParaRPr lang="en-US" dirty="0"/>
@@ -5951,12 +5982,12 @@
           <a:bodyPr anchor="ctr"/>
           <a:lstStyle/>
           <a:p>
-            <a:pPr marL="355600" indent="-220663">
+            <a:pPr marL="266700" indent="-165497">
               <a:buFont typeface="Arial" panose="020B0604020202020204" pitchFamily="34" charset="0"/>
               <a:buChar char="•"/>
             </a:pPr>
             <a:r>
-              <a:rPr lang="en-US" sz="2800" dirty="0"/>
+              <a:rPr lang="en-US" sz="2100" dirty="0"/>
               <a:t>Sample data blah blah</a:t>
             </a:r>
             <a:endParaRPr lang="en-US" dirty="0"/>
@@ -5995,6 +6026,65 @@
       </p:grpSpPr>
       <p:sp>
         <p:nvSpPr>
+          <p:cNvPr id="5" name="Rectangle 4">
+            <a:extLst>
+              <a:ext uri="{FF2B5EF4-FFF2-40B4-BE49-F238E27FC236}">
+                <a16:creationId xmlns:a16="http://schemas.microsoft.com/office/drawing/2014/main" id="{D16BB83D-6D1F-472E-946A-21897C5E4680}"/>
+              </a:ext>
+            </a:extLst>
+          </p:cNvPr>
+          <p:cNvSpPr/>
+          <p:nvPr/>
+        </p:nvSpPr>
+        <p:spPr>
+          <a:xfrm>
+            <a:off x="938404" y="1621119"/>
+            <a:ext cx="8153837" cy="388189"/>
+          </a:xfrm>
+          <a:prstGeom prst="rect">
+            <a:avLst/>
+          </a:prstGeom>
+          <a:solidFill>
+            <a:schemeClr val="bg1"/>
+          </a:solidFill>
+          <a:ln>
+            <a:solidFill>
+              <a:schemeClr val="bg1"/>
+            </a:solidFill>
+          </a:ln>
+        </p:spPr>
+        <p:style>
+          <a:lnRef idx="2">
+            <a:schemeClr val="accent1">
+              <a:shade val="50000"/>
+            </a:schemeClr>
+          </a:lnRef>
+          <a:fillRef idx="1">
+            <a:schemeClr val="accent1"/>
+          </a:fillRef>
+          <a:effectRef idx="0">
+            <a:schemeClr val="accent1"/>
+          </a:effectRef>
+          <a:fontRef idx="minor">
+            <a:schemeClr val="lt1"/>
+          </a:fontRef>
+        </p:style>
+        <p:txBody>
+          <a:bodyPr rot="0" spcFirstLastPara="0" vertOverflow="overflow" horzOverflow="overflow" vert="horz" wrap="square" lIns="68580" tIns="34290" rIns="68580" bIns="34290" numCol="1" spcCol="0" rtlCol="0" fromWordArt="0" anchor="ctr" anchorCtr="0" forceAA="0" compatLnSpc="1">
+            <a:prstTxWarp prst="textNoShape">
+              <a:avLst/>
+            </a:prstTxWarp>
+            <a:noAutofit/>
+          </a:bodyPr>
+          <a:lstStyle/>
+          <a:p>
+            <a:pPr algn="ctr"/>
+            <a:endParaRPr lang="en-AU" sz="1350"/>
+          </a:p>
+        </p:txBody>
+      </p:sp>
+      <p:sp>
+        <p:nvSpPr>
           <p:cNvPr id="2" name="Title 1"/>
           <p:cNvSpPr>
             <a:spLocks noGrp="1"/>
@@ -6003,7 +6093,12 @@
             <p:ph type="title"/>
           </p:nvPr>
         </p:nvSpPr>
-        <p:spPr/>
+        <p:spPr>
+          <a:xfrm>
+            <a:off x="938404" y="395029"/>
+            <a:ext cx="7543800" cy="1088068"/>
+          </a:xfrm>
+        </p:spPr>
         <p:txBody>
           <a:bodyPr>
             <a:normAutofit/>
@@ -6017,29 +6112,35 @@
           </a:p>
         </p:txBody>
       </p:sp>
-      <p:sp>
-        <p:nvSpPr>
-          <p:cNvPr id="6" name="Content Placeholder 5"/>
-          <p:cNvSpPr>
-            <a:spLocks noGrp="1"/>
-          </p:cNvSpPr>
+      <p:pic>
+        <p:nvPicPr>
+          <p:cNvPr id="4" name="Content Placeholder 3">
+            <a:extLst>
+              <a:ext uri="{FF2B5EF4-FFF2-40B4-BE49-F238E27FC236}">
+                <a16:creationId xmlns:a16="http://schemas.microsoft.com/office/drawing/2014/main" id="{539F511F-ADEF-4C37-BDB8-CECFBD7DF537}"/>
+              </a:ext>
+            </a:extLst>
+          </p:cNvPr>
+          <p:cNvPicPr>
+            <a:picLocks noGrp="1" noChangeAspect="1"/>
+          </p:cNvPicPr>
           <p:nvPr>
             <p:ph idx="1"/>
           </p:nvPr>
-        </p:nvSpPr>
-        <p:spPr/>
-        <p:txBody>
-          <a:bodyPr anchor="ctr"/>
-          <a:lstStyle/>
-          <a:p>
-            <a:pPr marL="355600" indent="-220663">
-              <a:buFont typeface="Arial" panose="020B0604020202020204" pitchFamily="34" charset="0"/>
-              <a:buChar char="•"/>
-            </a:pPr>
-            <a:endParaRPr lang="en-US" dirty="0"/>
-          </a:p>
-        </p:txBody>
-      </p:sp>
+        </p:nvPicPr>
+        <p:blipFill>
+          <a:blip r:embed="rId3"/>
+          <a:stretch>
+            <a:fillRect/>
+          </a:stretch>
+        </p:blipFill>
+        <p:spPr>
+          <a:xfrm>
+            <a:off x="1594010" y="1483097"/>
+            <a:ext cx="6640192" cy="4443251"/>
+          </a:xfrm>
+        </p:spPr>
+      </p:pic>
     </p:spTree>
     <p:extLst>
       <p:ext uri="{BB962C8B-B14F-4D97-AF65-F5344CB8AC3E}">
@@ -6109,40 +6210,14 @@
           <a:bodyPr anchor="ctr"/>
           <a:lstStyle/>
           <a:p>
-            <a:pPr marL="355600" indent="-220663">
+            <a:pPr marL="266700" indent="-165497">
               <a:buFont typeface="Arial" panose="020B0604020202020204" pitchFamily="34" charset="0"/>
               <a:buChar char="•"/>
             </a:pPr>
             <a:r>
-              <a:rPr lang="en-US" sz="2800" dirty="0"/>
-              <a:t>Project Plan</a:t>
-            </a:r>
-          </a:p>
-          <a:p>
-            <a:pPr marL="355600" indent="-220663">
-              <a:buFont typeface="Arial" panose="020B0604020202020204" pitchFamily="34" charset="0"/>
-              <a:buChar char="•"/>
-            </a:pPr>
-            <a:r>
-              <a:rPr lang="en-US" sz="2800" dirty="0"/>
-              <a:t>Meetings</a:t>
-            </a:r>
-          </a:p>
-          <a:p>
-            <a:pPr marL="355600" indent="-220663">
-              <a:buFont typeface="Arial" panose="020B0604020202020204" pitchFamily="34" charset="0"/>
-              <a:buChar char="•"/>
-            </a:pPr>
-            <a:r>
-              <a:rPr lang="en-US" sz="2800" dirty="0"/>
-              <a:t>Agendas and Minutes</a:t>
-            </a:r>
-          </a:p>
-          <a:p>
-            <a:pPr>
-              <a:buFont typeface="Arial" panose="020B0604020202020204" pitchFamily="34" charset="0"/>
-              <a:buChar char="•"/>
-            </a:pPr>
+              <a:rPr lang="en-US" sz="2100" dirty="0"/>
+              <a:t>Questions?</a:t>
+            </a:r>
             <a:endParaRPr lang="en-US" dirty="0"/>
           </a:p>
         </p:txBody>

</xml_diff>